<commit_message>
Update Multi-Sandbox Getting Started for NXP RT1170
</commit_message>
<xml_diff>
--- a/SDK6UserGuide/images/gettingStarted/multiSandbox/multiSandboxGettingStartedImages.pptx
+++ b/SDK6UserGuide/images/gettingStarted/multiSandbox/multiSandboxGettingStartedImages.pptx
@@ -5,13 +5,15 @@
     <p:sldMasterId id="2147483660" r:id="rId1"/>
   </p:sldMasterIdLst>
   <p:notesMasterIdLst>
-    <p:notesMasterId r:id="rId3"/>
+    <p:notesMasterId r:id="rId5"/>
   </p:notesMasterIdLst>
   <p:handoutMasterIdLst>
-    <p:handoutMasterId r:id="rId4"/>
+    <p:handoutMasterId r:id="rId6"/>
   </p:handoutMasterIdLst>
   <p:sldIdLst>
     <p:sldId id="691" r:id="rId2"/>
+    <p:sldId id="692" r:id="rId3"/>
+    <p:sldId id="693" r:id="rId4"/>
   </p:sldIdLst>
   <p:sldSz cx="12192000" cy="6858000"/>
   <p:notesSz cx="6858000" cy="9144000"/>
@@ -218,7 +220,7 @@
               <a:rPr lang="fr-FR" smtClean="0">
                 <a:latin typeface="Calibri Regular" charset="0"/>
               </a:rPr>
-              <a:t>mercredi 30 octobre 2024</a:t>
+              <a:t>mercredi 27 novembre 2024</a:t>
             </a:fld>
             <a:endParaRPr lang="en-US" dirty="0">
               <a:latin typeface="Calibri Regular" charset="0"/>
@@ -396,7 +398,7 @@
           <a:p>
             <a:fld id="{885721CF-495B-2B41-A23A-4D3221F80235}" type="datetime2">
               <a:rPr lang="fr-FR" smtClean="0"/>
-              <a:t>mercredi 30 octobre 2024</a:t>
+              <a:t>mercredi 27 novembre 2024</a:t>
             </a:fld>
             <a:endParaRPr lang="en-US" dirty="0"/>
           </a:p>
@@ -18111,6 +18113,2429 @@
     <p:extLst>
       <p:ext uri="{BB962C8B-B14F-4D97-AF65-F5344CB8AC3E}">
         <p14:creationId xmlns:p14="http://schemas.microsoft.com/office/powerpoint/2010/main" val="1907886352"/>
+      </p:ext>
+    </p:extLst>
+  </p:cSld>
+  <p:clrMapOvr>
+    <a:masterClrMapping/>
+  </p:clrMapOvr>
+</p:sld>
+</file>
+
+<file path=ppt/slides/slide2.xml><?xml version="1.0" encoding="utf-8"?>
+<p:sld xmlns:a="http://schemas.openxmlformats.org/drawingml/2006/main" xmlns:r="http://schemas.openxmlformats.org/officeDocument/2006/relationships" xmlns:p="http://schemas.openxmlformats.org/presentationml/2006/main">
+  <p:cSld>
+    <p:spTree>
+      <p:nvGrpSpPr>
+        <p:cNvPr id="1" name="">
+          <a:extLst>
+            <a:ext uri="{FF2B5EF4-FFF2-40B4-BE49-F238E27FC236}">
+              <a16:creationId xmlns:a16="http://schemas.microsoft.com/office/drawing/2014/main" id="{8AACFAFF-530F-9BEB-DA3D-C1943473A360}"/>
+            </a:ext>
+          </a:extLst>
+        </p:cNvPr>
+        <p:cNvGrpSpPr/>
+        <p:nvPr/>
+      </p:nvGrpSpPr>
+      <p:grpSpPr>
+        <a:xfrm>
+          <a:off x="0" y="0"/>
+          <a:ext cx="0" cy="0"/>
+          <a:chOff x="0" y="0"/>
+          <a:chExt cx="0" cy="0"/>
+        </a:xfrm>
+      </p:grpSpPr>
+      <p:sp>
+        <p:nvSpPr>
+          <p:cNvPr id="6" name="Rounded Rectangle 76">
+            <a:extLst>
+              <a:ext uri="{FF2B5EF4-FFF2-40B4-BE49-F238E27FC236}">
+                <a16:creationId xmlns:a16="http://schemas.microsoft.com/office/drawing/2014/main" id="{CBB0C029-B54C-A359-0A82-C2C366EF62EF}"/>
+              </a:ext>
+            </a:extLst>
+          </p:cNvPr>
+          <p:cNvSpPr/>
+          <p:nvPr/>
+        </p:nvSpPr>
+        <p:spPr>
+          <a:xfrm>
+            <a:off x="4496469" y="391262"/>
+            <a:ext cx="2090505" cy="6272351"/>
+          </a:xfrm>
+          <a:prstGeom prst="roundRect">
+            <a:avLst>
+              <a:gd name="adj" fmla="val 17902"/>
+            </a:avLst>
+          </a:prstGeom>
+          <a:solidFill>
+            <a:schemeClr val="bg1"/>
+          </a:solidFill>
+          <a:ln w="19050">
+            <a:solidFill>
+              <a:schemeClr val="bg2"/>
+            </a:solidFill>
+          </a:ln>
+        </p:spPr>
+        <p:style>
+          <a:lnRef idx="2">
+            <a:schemeClr val="accent1">
+              <a:shade val="50000"/>
+            </a:schemeClr>
+          </a:lnRef>
+          <a:fillRef idx="1">
+            <a:schemeClr val="accent1"/>
+          </a:fillRef>
+          <a:effectRef idx="0">
+            <a:schemeClr val="accent1"/>
+          </a:effectRef>
+          <a:fontRef idx="minor">
+            <a:schemeClr val="lt1"/>
+          </a:fontRef>
+        </p:style>
+        <p:txBody>
+          <a:bodyPr rtlCol="0" anchor="ctr"/>
+          <a:lstStyle/>
+          <a:p>
+            <a:pPr algn="ctr"/>
+            <a:endParaRPr lang="en-US" dirty="0">
+              <a:solidFill>
+                <a:schemeClr val="tx2"/>
+              </a:solidFill>
+            </a:endParaRPr>
+          </a:p>
+        </p:txBody>
+      </p:sp>
+      <p:sp>
+        <p:nvSpPr>
+          <p:cNvPr id="15" name="TextBox 14">
+            <a:extLst>
+              <a:ext uri="{FF2B5EF4-FFF2-40B4-BE49-F238E27FC236}">
+                <a16:creationId xmlns:a16="http://schemas.microsoft.com/office/drawing/2014/main" id="{9ACB78E6-B9FC-975C-DBD1-03956B7D1961}"/>
+              </a:ext>
+            </a:extLst>
+          </p:cNvPr>
+          <p:cNvSpPr txBox="1"/>
+          <p:nvPr/>
+        </p:nvSpPr>
+        <p:spPr>
+          <a:xfrm>
+            <a:off x="4496469" y="4586863"/>
+            <a:ext cx="2066038" cy="1710020"/>
+          </a:xfrm>
+          <a:prstGeom prst="rect">
+            <a:avLst/>
+          </a:prstGeom>
+          <a:noFill/>
+        </p:spPr>
+        <p:txBody>
+          <a:bodyPr wrap="square" rtlCol="0">
+            <a:spAutoFit/>
+          </a:bodyPr>
+          <a:lstStyle/>
+          <a:p>
+            <a:pPr algn="ctr">
+              <a:lnSpc>
+                <a:spcPts val="1400"/>
+              </a:lnSpc>
+            </a:pPr>
+            <a:endParaRPr lang="en-US" sz="1600" dirty="0">
+              <a:solidFill>
+                <a:schemeClr val="tx2"/>
+              </a:solidFill>
+              <a:latin typeface="Source Sans Pro" charset="0"/>
+              <a:ea typeface="Source Sans Pro" charset="0"/>
+              <a:cs typeface="Source Sans Pro" charset="0"/>
+            </a:endParaRPr>
+          </a:p>
+          <a:p>
+            <a:pPr marL="171450" indent="-171450">
+              <a:lnSpc>
+                <a:spcPts val="1400"/>
+              </a:lnSpc>
+              <a:buFont typeface="Arial" panose="020B0604020202020204" pitchFamily="34" charset="0"/>
+              <a:buChar char="•"/>
+            </a:pPr>
+            <a:r>
+              <a:rPr lang="en-US" sz="1400" dirty="0">
+                <a:solidFill>
+                  <a:schemeClr val="tx2"/>
+                </a:solidFill>
+                <a:latin typeface="Source Sans Pro" charset="0"/>
+                <a:ea typeface="Source Sans Pro" charset="0"/>
+                <a:cs typeface="Source Sans Pro" charset="0"/>
+              </a:rPr>
+              <a:t>Executable built from Kernel GREEN sources</a:t>
+            </a:r>
+          </a:p>
+          <a:p>
+            <a:pPr marL="171450" indent="-171450">
+              <a:lnSpc>
+                <a:spcPts val="1400"/>
+              </a:lnSpc>
+              <a:buFont typeface="Arial" panose="020B0604020202020204" pitchFamily="34" charset="0"/>
+              <a:buChar char="•"/>
+            </a:pPr>
+            <a:r>
+              <a:rPr lang="en-US" sz="1400" dirty="0">
+                <a:solidFill>
+                  <a:schemeClr val="tx2"/>
+                </a:solidFill>
+                <a:latin typeface="Source Sans Pro" charset="0"/>
+                <a:ea typeface="Source Sans Pro" charset="0"/>
+                <a:cs typeface="Source Sans Pro" charset="0"/>
+              </a:rPr>
+              <a:t>Runs App Connect server</a:t>
+            </a:r>
+          </a:p>
+          <a:p>
+            <a:pPr marL="171450" indent="-171450">
+              <a:lnSpc>
+                <a:spcPts val="1400"/>
+              </a:lnSpc>
+              <a:buFont typeface="Arial" panose="020B0604020202020204" pitchFamily="34" charset="0"/>
+              <a:buChar char="•"/>
+            </a:pPr>
+            <a:r>
+              <a:rPr lang="en-US" sz="1400" dirty="0">
+                <a:solidFill>
+                  <a:schemeClr val="tx2"/>
+                </a:solidFill>
+                <a:latin typeface="Source Sans Pro" charset="0"/>
+                <a:ea typeface="Source Sans Pro" charset="0"/>
+                <a:cs typeface="Source Sans Pro" charset="0"/>
+              </a:rPr>
+              <a:t>Applications stored in File System.</a:t>
+            </a:r>
+          </a:p>
+          <a:p>
+            <a:pPr marL="171450" indent="-171450">
+              <a:lnSpc>
+                <a:spcPts val="1400"/>
+              </a:lnSpc>
+              <a:buFont typeface="Arial" panose="020B0604020202020204" pitchFamily="34" charset="0"/>
+              <a:buChar char="•"/>
+            </a:pPr>
+            <a:r>
+              <a:rPr lang="en-US" sz="1400" dirty="0">
+                <a:solidFill>
+                  <a:schemeClr val="tx2"/>
+                </a:solidFill>
+                <a:latin typeface="Source Sans Pro" charset="0"/>
+                <a:ea typeface="Source Sans Pro" charset="0"/>
+                <a:cs typeface="Source Sans Pro" charset="0"/>
+              </a:rPr>
+              <a:t>Applications executed in RAM.</a:t>
+            </a:r>
+            <a:endParaRPr lang="en-US" sz="1600" dirty="0">
+              <a:solidFill>
+                <a:schemeClr val="tx2"/>
+              </a:solidFill>
+              <a:latin typeface="Source Sans Pro" charset="0"/>
+              <a:ea typeface="Source Sans Pro" charset="0"/>
+              <a:cs typeface="Source Sans Pro" charset="0"/>
+            </a:endParaRPr>
+          </a:p>
+        </p:txBody>
+      </p:sp>
+      <p:pic>
+        <p:nvPicPr>
+          <p:cNvPr id="17" name="Picture 16">
+            <a:extLst>
+              <a:ext uri="{FF2B5EF4-FFF2-40B4-BE49-F238E27FC236}">
+                <a16:creationId xmlns:a16="http://schemas.microsoft.com/office/drawing/2014/main" id="{065F547B-52D0-99E8-52A1-CFC59B1E85EC}"/>
+              </a:ext>
+            </a:extLst>
+          </p:cNvPr>
+          <p:cNvPicPr>
+            <a:picLocks noChangeAspect="1"/>
+          </p:cNvPicPr>
+          <p:nvPr/>
+        </p:nvPicPr>
+        <p:blipFill>
+          <a:blip r:embed="rId2"/>
+          <a:stretch>
+            <a:fillRect/>
+          </a:stretch>
+        </p:blipFill>
+        <p:spPr>
+          <a:xfrm rot="16200000">
+            <a:off x="4537309" y="2824351"/>
+            <a:ext cx="1954127" cy="1455693"/>
+          </a:xfrm>
+          <a:prstGeom prst="rect">
+            <a:avLst/>
+          </a:prstGeom>
+        </p:spPr>
+      </p:pic>
+      <p:sp>
+        <p:nvSpPr>
+          <p:cNvPr id="2" name="Date Placeholder 1">
+            <a:extLst>
+              <a:ext uri="{FF2B5EF4-FFF2-40B4-BE49-F238E27FC236}">
+                <a16:creationId xmlns:a16="http://schemas.microsoft.com/office/drawing/2014/main" id="{159FF6F5-E4F2-EF7C-C05E-DDC7085364BE}"/>
+              </a:ext>
+            </a:extLst>
+          </p:cNvPr>
+          <p:cNvSpPr>
+            <a:spLocks noGrp="1"/>
+          </p:cNvSpPr>
+          <p:nvPr>
+            <p:ph type="dt" sz="half" idx="10"/>
+          </p:nvPr>
+        </p:nvSpPr>
+        <p:spPr>
+          <a:xfrm>
+            <a:off x="9358334" y="6453337"/>
+            <a:ext cx="1296144" cy="144016"/>
+          </a:xfrm>
+        </p:spPr>
+        <p:txBody>
+          <a:bodyPr/>
+          <a:lstStyle/>
+          <a:p>
+            <a:r>
+              <a:rPr lang="en-US" dirty="0"/>
+              <a:t>Oct 2020</a:t>
+            </a:r>
+          </a:p>
+        </p:txBody>
+      </p:sp>
+      <p:sp>
+        <p:nvSpPr>
+          <p:cNvPr id="4" name="Rounded Rectangle 76">
+            <a:extLst>
+              <a:ext uri="{FF2B5EF4-FFF2-40B4-BE49-F238E27FC236}">
+                <a16:creationId xmlns:a16="http://schemas.microsoft.com/office/drawing/2014/main" id="{920C872C-B089-18B0-52C9-CAF623ACBDDF}"/>
+              </a:ext>
+            </a:extLst>
+          </p:cNvPr>
+          <p:cNvSpPr/>
+          <p:nvPr/>
+        </p:nvSpPr>
+        <p:spPr>
+          <a:xfrm>
+            <a:off x="7946246" y="328475"/>
+            <a:ext cx="4120321" cy="6268878"/>
+          </a:xfrm>
+          <a:prstGeom prst="roundRect">
+            <a:avLst>
+              <a:gd name="adj" fmla="val 17902"/>
+            </a:avLst>
+          </a:prstGeom>
+          <a:solidFill>
+            <a:schemeClr val="bg1"/>
+          </a:solidFill>
+          <a:ln w="19050">
+            <a:solidFill>
+              <a:schemeClr val="bg2"/>
+            </a:solidFill>
+          </a:ln>
+        </p:spPr>
+        <p:style>
+          <a:lnRef idx="2">
+            <a:schemeClr val="accent1">
+              <a:shade val="50000"/>
+            </a:schemeClr>
+          </a:lnRef>
+          <a:fillRef idx="1">
+            <a:schemeClr val="accent1"/>
+          </a:fillRef>
+          <a:effectRef idx="0">
+            <a:schemeClr val="accent1"/>
+          </a:effectRef>
+          <a:fontRef idx="minor">
+            <a:schemeClr val="lt1"/>
+          </a:fontRef>
+        </p:style>
+        <p:txBody>
+          <a:bodyPr rtlCol="0" anchor="ctr"/>
+          <a:lstStyle/>
+          <a:p>
+            <a:pPr algn="ctr"/>
+            <a:endParaRPr lang="en-US" dirty="0"/>
+          </a:p>
+        </p:txBody>
+      </p:sp>
+      <p:pic>
+        <p:nvPicPr>
+          <p:cNvPr id="5" name="Picture 4">
+            <a:extLst>
+              <a:ext uri="{FF2B5EF4-FFF2-40B4-BE49-F238E27FC236}">
+                <a16:creationId xmlns:a16="http://schemas.microsoft.com/office/drawing/2014/main" id="{C14411E2-B92A-C67F-42AF-FF2F3FA93A59}"/>
+              </a:ext>
+            </a:extLst>
+          </p:cNvPr>
+          <p:cNvPicPr>
+            <a:picLocks noChangeAspect="1"/>
+          </p:cNvPicPr>
+          <p:nvPr/>
+        </p:nvPicPr>
+        <p:blipFill>
+          <a:blip r:embed="rId3"/>
+          <a:stretch>
+            <a:fillRect/>
+          </a:stretch>
+        </p:blipFill>
+        <p:spPr>
+          <a:xfrm>
+            <a:off x="8248525" y="2605211"/>
+            <a:ext cx="3515763" cy="2383346"/>
+          </a:xfrm>
+          <a:prstGeom prst="rect">
+            <a:avLst/>
+          </a:prstGeom>
+        </p:spPr>
+      </p:pic>
+      <p:pic>
+        <p:nvPicPr>
+          <p:cNvPr id="7" name="Picture 6">
+            <a:extLst>
+              <a:ext uri="{FF2B5EF4-FFF2-40B4-BE49-F238E27FC236}">
+                <a16:creationId xmlns:a16="http://schemas.microsoft.com/office/drawing/2014/main" id="{1B0F7AA6-CF80-11CF-E298-B2AB748BCFE3}"/>
+              </a:ext>
+            </a:extLst>
+          </p:cNvPr>
+          <p:cNvPicPr>
+            <a:picLocks noChangeAspect="1"/>
+          </p:cNvPicPr>
+          <p:nvPr/>
+        </p:nvPicPr>
+        <p:blipFill>
+          <a:blip r:embed="rId4" cstate="print">
+            <a:extLst>
+              <a:ext uri="{28A0092B-C50C-407E-A947-70E740481C1C}">
+                <a14:useLocalDpi xmlns:a14="http://schemas.microsoft.com/office/drawing/2010/main" val="0"/>
+              </a:ext>
+            </a:extLst>
+          </a:blip>
+          <a:stretch>
+            <a:fillRect/>
+          </a:stretch>
+        </p:blipFill>
+        <p:spPr>
+          <a:xfrm>
+            <a:off x="5301898" y="6056313"/>
+            <a:ext cx="1208705" cy="607300"/>
+          </a:xfrm>
+          <a:prstGeom prst="rect">
+            <a:avLst/>
+          </a:prstGeom>
+        </p:spPr>
+      </p:pic>
+      <p:sp>
+        <p:nvSpPr>
+          <p:cNvPr id="8" name="TextBox 7">
+            <a:extLst>
+              <a:ext uri="{FF2B5EF4-FFF2-40B4-BE49-F238E27FC236}">
+                <a16:creationId xmlns:a16="http://schemas.microsoft.com/office/drawing/2014/main" id="{9B87151C-9AFF-524B-900E-B58CA392962C}"/>
+              </a:ext>
+            </a:extLst>
+          </p:cNvPr>
+          <p:cNvSpPr txBox="1"/>
+          <p:nvPr/>
+        </p:nvSpPr>
+        <p:spPr>
+          <a:xfrm>
+            <a:off x="6252287" y="2942663"/>
+            <a:ext cx="2029527" cy="1169551"/>
+          </a:xfrm>
+          <a:prstGeom prst="rect">
+            <a:avLst/>
+          </a:prstGeom>
+          <a:noFill/>
+        </p:spPr>
+        <p:txBody>
+          <a:bodyPr wrap="square" rtlCol="0">
+            <a:spAutoFit/>
+          </a:bodyPr>
+          <a:lstStyle/>
+          <a:p>
+            <a:pPr algn="ctr">
+              <a:lnSpc>
+                <a:spcPts val="1400"/>
+              </a:lnSpc>
+            </a:pPr>
+            <a:r>
+              <a:rPr lang="en-US" sz="1400" dirty="0">
+                <a:solidFill>
+                  <a:schemeClr val="tx2"/>
+                </a:solidFill>
+                <a:latin typeface="Source Sans Pro" charset="0"/>
+                <a:ea typeface="Source Sans Pro" charset="0"/>
+                <a:cs typeface="Source Sans Pro" charset="0"/>
+              </a:rPr>
+              <a:t>App Connect </a:t>
+            </a:r>
+          </a:p>
+          <a:p>
+            <a:pPr algn="ctr">
+              <a:lnSpc>
+                <a:spcPts val="1400"/>
+              </a:lnSpc>
+            </a:pPr>
+            <a:r>
+              <a:rPr lang="en-US" sz="1400" dirty="0">
+                <a:solidFill>
+                  <a:schemeClr val="tx2"/>
+                </a:solidFill>
+                <a:latin typeface="Source Sans Pro" charset="0"/>
+                <a:ea typeface="Source Sans Pro" charset="0"/>
+                <a:cs typeface="Source Sans Pro" charset="0"/>
+              </a:rPr>
+              <a:t>REST APIs (HTTP)</a:t>
+            </a:r>
+          </a:p>
+          <a:p>
+            <a:pPr algn="ctr">
+              <a:lnSpc>
+                <a:spcPts val="1400"/>
+              </a:lnSpc>
+            </a:pPr>
+            <a:endParaRPr lang="en-US" sz="1400" dirty="0">
+              <a:solidFill>
+                <a:schemeClr val="tx2"/>
+              </a:solidFill>
+              <a:latin typeface="Source Sans Pro" charset="0"/>
+              <a:ea typeface="Source Sans Pro" charset="0"/>
+              <a:cs typeface="Source Sans Pro" charset="0"/>
+            </a:endParaRPr>
+          </a:p>
+          <a:p>
+            <a:pPr algn="ctr">
+              <a:lnSpc>
+                <a:spcPts val="1400"/>
+              </a:lnSpc>
+            </a:pPr>
+            <a:r>
+              <a:rPr lang="en-US" sz="1400" dirty="0">
+                <a:solidFill>
+                  <a:schemeClr val="tx2"/>
+                </a:solidFill>
+                <a:latin typeface="Source Sans Pro" charset="0"/>
+                <a:ea typeface="Source Sans Pro" charset="0"/>
+                <a:cs typeface="Source Sans Pro" charset="0"/>
+              </a:rPr>
+              <a:t>Commands,</a:t>
+            </a:r>
+          </a:p>
+          <a:p>
+            <a:pPr algn="ctr">
+              <a:lnSpc>
+                <a:spcPts val="1400"/>
+              </a:lnSpc>
+            </a:pPr>
+            <a:r>
+              <a:rPr lang="en-US" sz="1400" dirty="0">
+                <a:solidFill>
+                  <a:schemeClr val="tx2"/>
+                </a:solidFill>
+                <a:latin typeface="Source Sans Pro" charset="0"/>
+                <a:ea typeface="Source Sans Pro" charset="0"/>
+                <a:cs typeface="Source Sans Pro" charset="0"/>
+              </a:rPr>
+              <a:t>Status,</a:t>
+            </a:r>
+          </a:p>
+          <a:p>
+            <a:pPr algn="ctr">
+              <a:lnSpc>
+                <a:spcPts val="1400"/>
+              </a:lnSpc>
+            </a:pPr>
+            <a:r>
+              <a:rPr lang="en-US" sz="1400" dirty="0">
+                <a:solidFill>
+                  <a:schemeClr val="tx2"/>
+                </a:solidFill>
+                <a:latin typeface="Source Sans Pro" charset="0"/>
+                <a:ea typeface="Source Sans Pro" charset="0"/>
+                <a:cs typeface="Source Sans Pro" charset="0"/>
+              </a:rPr>
+              <a:t>App installation</a:t>
+            </a:r>
+          </a:p>
+        </p:txBody>
+      </p:sp>
+      <p:sp>
+        <p:nvSpPr>
+          <p:cNvPr id="10" name="TextBox 9">
+            <a:extLst>
+              <a:ext uri="{FF2B5EF4-FFF2-40B4-BE49-F238E27FC236}">
+                <a16:creationId xmlns:a16="http://schemas.microsoft.com/office/drawing/2014/main" id="{E095E11E-946F-D294-3CAF-08CA09A35C37}"/>
+              </a:ext>
+            </a:extLst>
+          </p:cNvPr>
+          <p:cNvSpPr txBox="1"/>
+          <p:nvPr/>
+        </p:nvSpPr>
+        <p:spPr>
+          <a:xfrm>
+            <a:off x="8179432" y="5318018"/>
+            <a:ext cx="3653949" cy="1171411"/>
+          </a:xfrm>
+          <a:prstGeom prst="rect">
+            <a:avLst/>
+          </a:prstGeom>
+          <a:noFill/>
+        </p:spPr>
+        <p:txBody>
+          <a:bodyPr wrap="square" rtlCol="0">
+            <a:spAutoFit/>
+          </a:bodyPr>
+          <a:lstStyle/>
+          <a:p>
+            <a:pPr marL="171450" indent="-171450">
+              <a:lnSpc>
+                <a:spcPts val="1400"/>
+              </a:lnSpc>
+              <a:buFont typeface="Arial" panose="020B0604020202020204" pitchFamily="34" charset="0"/>
+              <a:buChar char="•"/>
+            </a:pPr>
+            <a:r>
+              <a:rPr lang="en-US" sz="1400" dirty="0">
+                <a:solidFill>
+                  <a:schemeClr val="tx2"/>
+                </a:solidFill>
+                <a:latin typeface="Source Sans Pro" charset="0"/>
+              </a:rPr>
+              <a:t>Webapp hosted by the VEE.</a:t>
+            </a:r>
+          </a:p>
+          <a:p>
+            <a:pPr marL="171450" indent="-171450">
+              <a:lnSpc>
+                <a:spcPts val="1400"/>
+              </a:lnSpc>
+              <a:buFont typeface="Arial" panose="020B0604020202020204" pitchFamily="34" charset="0"/>
+              <a:buChar char="•"/>
+            </a:pPr>
+            <a:r>
+              <a:rPr lang="en-US" sz="1400" dirty="0">
+                <a:solidFill>
+                  <a:schemeClr val="tx2"/>
+                </a:solidFill>
+                <a:latin typeface="Source Sans Pro" charset="0"/>
+              </a:rPr>
+              <a:t>Features:</a:t>
+            </a:r>
+          </a:p>
+          <a:p>
+            <a:pPr marL="628650" lvl="1" indent="-171450">
+              <a:lnSpc>
+                <a:spcPts val="1400"/>
+              </a:lnSpc>
+              <a:buFont typeface="Arial" panose="020B0604020202020204" pitchFamily="34" charset="0"/>
+              <a:buChar char="•"/>
+            </a:pPr>
+            <a:r>
+              <a:rPr lang="en-US" sz="1400" dirty="0">
+                <a:solidFill>
+                  <a:schemeClr val="tx2"/>
+                </a:solidFill>
+                <a:latin typeface="Source Sans Pro" charset="0"/>
+                <a:ea typeface="Source Sans Pro" charset="0"/>
+                <a:cs typeface="Source Sans Pro" charset="0"/>
+              </a:rPr>
+              <a:t>Manage installed apps lifecycle</a:t>
+            </a:r>
+          </a:p>
+          <a:p>
+            <a:pPr marL="628650" lvl="1" indent="-171450">
+              <a:lnSpc>
+                <a:spcPts val="1400"/>
+              </a:lnSpc>
+              <a:buFont typeface="Arial" panose="020B0604020202020204" pitchFamily="34" charset="0"/>
+              <a:buChar char="•"/>
+            </a:pPr>
+            <a:r>
+              <a:rPr lang="en-US" sz="1400" dirty="0">
+                <a:solidFill>
+                  <a:schemeClr val="tx2"/>
+                </a:solidFill>
+                <a:latin typeface="Source Sans Pro" charset="0"/>
+                <a:ea typeface="Source Sans Pro" charset="0"/>
+                <a:cs typeface="Source Sans Pro" charset="0"/>
+              </a:rPr>
+              <a:t>Can connect to an application store</a:t>
+            </a:r>
+          </a:p>
+          <a:p>
+            <a:pPr marL="628650" lvl="1" indent="-171450">
+              <a:lnSpc>
+                <a:spcPts val="1400"/>
+              </a:lnSpc>
+              <a:buFont typeface="Arial" panose="020B0604020202020204" pitchFamily="34" charset="0"/>
+              <a:buChar char="•"/>
+            </a:pPr>
+            <a:r>
+              <a:rPr lang="en-US" sz="1400" dirty="0">
+                <a:solidFill>
+                  <a:schemeClr val="tx2"/>
+                </a:solidFill>
+                <a:latin typeface="Source Sans Pro" charset="0"/>
+                <a:ea typeface="Source Sans Pro" charset="0"/>
+                <a:cs typeface="Source Sans Pro" charset="0"/>
+              </a:rPr>
+              <a:t>List compatible applications with the device</a:t>
+            </a:r>
+          </a:p>
+        </p:txBody>
+      </p:sp>
+      <p:cxnSp>
+        <p:nvCxnSpPr>
+          <p:cNvPr id="12" name="Straight Connector 11">
+            <a:extLst>
+              <a:ext uri="{FF2B5EF4-FFF2-40B4-BE49-F238E27FC236}">
+                <a16:creationId xmlns:a16="http://schemas.microsoft.com/office/drawing/2014/main" id="{4A6A3E18-6364-0EEF-FA08-DD9474006C1F}"/>
+              </a:ext>
+            </a:extLst>
+          </p:cNvPr>
+          <p:cNvCxnSpPr>
+            <a:cxnSpLocks/>
+          </p:cNvCxnSpPr>
+          <p:nvPr/>
+        </p:nvCxnSpPr>
+        <p:spPr>
+          <a:xfrm>
+            <a:off x="6691696" y="3453595"/>
+            <a:ext cx="1080704" cy="0"/>
+          </a:xfrm>
+          <a:prstGeom prst="line">
+            <a:avLst/>
+          </a:prstGeom>
+          <a:ln w="28575">
+            <a:solidFill>
+              <a:schemeClr val="tx2">
+                <a:lumMod val="60000"/>
+                <a:lumOff val="40000"/>
+              </a:schemeClr>
+            </a:solidFill>
+            <a:headEnd type="triangle" w="med" len="med"/>
+            <a:tailEnd type="triangle" w="med" len="med"/>
+          </a:ln>
+        </p:spPr>
+        <p:style>
+          <a:lnRef idx="1">
+            <a:schemeClr val="accent1"/>
+          </a:lnRef>
+          <a:fillRef idx="0">
+            <a:schemeClr val="accent1"/>
+          </a:fillRef>
+          <a:effectRef idx="0">
+            <a:schemeClr val="accent1"/>
+          </a:effectRef>
+          <a:fontRef idx="minor">
+            <a:schemeClr val="tx1"/>
+          </a:fontRef>
+        </p:style>
+      </p:cxnSp>
+      <p:sp>
+        <p:nvSpPr>
+          <p:cNvPr id="13" name="TextBox 12">
+            <a:extLst>
+              <a:ext uri="{FF2B5EF4-FFF2-40B4-BE49-F238E27FC236}">
+                <a16:creationId xmlns:a16="http://schemas.microsoft.com/office/drawing/2014/main" id="{3490248E-709A-6B4A-171A-1ABE82391458}"/>
+              </a:ext>
+            </a:extLst>
+          </p:cNvPr>
+          <p:cNvSpPr txBox="1"/>
+          <p:nvPr/>
+        </p:nvSpPr>
+        <p:spPr>
+          <a:xfrm>
+            <a:off x="8789469" y="5014218"/>
+            <a:ext cx="2433874" cy="273729"/>
+          </a:xfrm>
+          <a:prstGeom prst="rect">
+            <a:avLst/>
+          </a:prstGeom>
+          <a:noFill/>
+        </p:spPr>
+        <p:txBody>
+          <a:bodyPr wrap="square" rtlCol="0">
+            <a:spAutoFit/>
+          </a:bodyPr>
+          <a:lstStyle/>
+          <a:p>
+            <a:pPr algn="ctr">
+              <a:lnSpc>
+                <a:spcPts val="1400"/>
+              </a:lnSpc>
+            </a:pPr>
+            <a:r>
+              <a:rPr lang="en-US" sz="1400" b="1" dirty="0">
+                <a:solidFill>
+                  <a:schemeClr val="tx2"/>
+                </a:solidFill>
+                <a:latin typeface="Source Sans Pro" charset="0"/>
+                <a:ea typeface="Source Sans Pro" charset="0"/>
+                <a:cs typeface="Source Sans Pro" charset="0"/>
+              </a:rPr>
+              <a:t>APP CONNECT WEB VIEW</a:t>
+            </a:r>
+            <a:endParaRPr lang="en-US" sz="1200" dirty="0">
+              <a:solidFill>
+                <a:schemeClr val="tx2"/>
+              </a:solidFill>
+              <a:latin typeface="Source Sans Pro" charset="0"/>
+              <a:ea typeface="Source Sans Pro" charset="0"/>
+              <a:cs typeface="Source Sans Pro" charset="0"/>
+            </a:endParaRPr>
+          </a:p>
+        </p:txBody>
+      </p:sp>
+      <p:sp>
+        <p:nvSpPr>
+          <p:cNvPr id="29" name="Rounded Rectangle 76">
+            <a:extLst>
+              <a:ext uri="{FF2B5EF4-FFF2-40B4-BE49-F238E27FC236}">
+                <a16:creationId xmlns:a16="http://schemas.microsoft.com/office/drawing/2014/main" id="{D8BCA485-1A19-C688-0FC2-ED29AF0ACDDF}"/>
+              </a:ext>
+            </a:extLst>
+          </p:cNvPr>
+          <p:cNvSpPr/>
+          <p:nvPr/>
+        </p:nvSpPr>
+        <p:spPr>
+          <a:xfrm>
+            <a:off x="223600" y="328474"/>
+            <a:ext cx="2757182" cy="6272351"/>
+          </a:xfrm>
+          <a:prstGeom prst="roundRect">
+            <a:avLst>
+              <a:gd name="adj" fmla="val 17902"/>
+            </a:avLst>
+          </a:prstGeom>
+          <a:solidFill>
+            <a:schemeClr val="bg1"/>
+          </a:solidFill>
+          <a:ln w="19050">
+            <a:solidFill>
+              <a:schemeClr val="bg2"/>
+            </a:solidFill>
+          </a:ln>
+        </p:spPr>
+        <p:style>
+          <a:lnRef idx="2">
+            <a:schemeClr val="accent1">
+              <a:shade val="50000"/>
+            </a:schemeClr>
+          </a:lnRef>
+          <a:fillRef idx="1">
+            <a:schemeClr val="accent1"/>
+          </a:fillRef>
+          <a:effectRef idx="0">
+            <a:schemeClr val="accent1"/>
+          </a:effectRef>
+          <a:fontRef idx="minor">
+            <a:schemeClr val="lt1"/>
+          </a:fontRef>
+        </p:style>
+        <p:txBody>
+          <a:bodyPr rtlCol="0" anchor="ctr"/>
+          <a:lstStyle/>
+          <a:p>
+            <a:pPr algn="ctr"/>
+            <a:endParaRPr lang="en-US" dirty="0">
+              <a:solidFill>
+                <a:schemeClr val="tx2"/>
+              </a:solidFill>
+            </a:endParaRPr>
+          </a:p>
+        </p:txBody>
+      </p:sp>
+      <p:pic>
+        <p:nvPicPr>
+          <p:cNvPr id="31" name="Picture 30">
+            <a:extLst>
+              <a:ext uri="{FF2B5EF4-FFF2-40B4-BE49-F238E27FC236}">
+                <a16:creationId xmlns:a16="http://schemas.microsoft.com/office/drawing/2014/main" id="{D26C1DBF-838A-31A2-9B05-394EEB6D35C6}"/>
+              </a:ext>
+            </a:extLst>
+          </p:cNvPr>
+          <p:cNvPicPr>
+            <a:picLocks noChangeAspect="1"/>
+          </p:cNvPicPr>
+          <p:nvPr/>
+        </p:nvPicPr>
+        <p:blipFill>
+          <a:blip r:embed="rId5" cstate="print">
+            <a:extLst>
+              <a:ext uri="{28A0092B-C50C-407E-A947-70E740481C1C}">
+                <a14:useLocalDpi xmlns:a14="http://schemas.microsoft.com/office/drawing/2010/main" val="0"/>
+              </a:ext>
+            </a:extLst>
+          </a:blip>
+          <a:stretch>
+            <a:fillRect/>
+          </a:stretch>
+        </p:blipFill>
+        <p:spPr>
+          <a:xfrm>
+            <a:off x="984651" y="434290"/>
+            <a:ext cx="1235080" cy="786746"/>
+          </a:xfrm>
+          <a:prstGeom prst="rect">
+            <a:avLst/>
+          </a:prstGeom>
+        </p:spPr>
+      </p:pic>
+      <p:sp>
+        <p:nvSpPr>
+          <p:cNvPr id="32" name="TextBox 31">
+            <a:extLst>
+              <a:ext uri="{FF2B5EF4-FFF2-40B4-BE49-F238E27FC236}">
+                <a16:creationId xmlns:a16="http://schemas.microsoft.com/office/drawing/2014/main" id="{9E657F74-0BAA-C9A1-63EE-31EB7042580A}"/>
+              </a:ext>
+            </a:extLst>
+          </p:cNvPr>
+          <p:cNvSpPr txBox="1"/>
+          <p:nvPr/>
+        </p:nvSpPr>
+        <p:spPr>
+          <a:xfrm>
+            <a:off x="637305" y="1222477"/>
+            <a:ext cx="1929773" cy="287130"/>
+          </a:xfrm>
+          <a:prstGeom prst="rect">
+            <a:avLst/>
+          </a:prstGeom>
+          <a:noFill/>
+        </p:spPr>
+        <p:txBody>
+          <a:bodyPr wrap="square" rtlCol="0">
+            <a:spAutoFit/>
+          </a:bodyPr>
+          <a:lstStyle/>
+          <a:p>
+            <a:pPr algn="ctr">
+              <a:lnSpc>
+                <a:spcPts val="1400"/>
+              </a:lnSpc>
+            </a:pPr>
+            <a:r>
+              <a:rPr lang="en-US" b="1" dirty="0">
+                <a:solidFill>
+                  <a:schemeClr val="tx2"/>
+                </a:solidFill>
+                <a:latin typeface="Source Sans Pro" charset="0"/>
+                <a:ea typeface="Source Sans Pro" charset="0"/>
+                <a:cs typeface="Source Sans Pro" charset="0"/>
+              </a:rPr>
+              <a:t>App Developer</a:t>
+            </a:r>
+          </a:p>
+        </p:txBody>
+      </p:sp>
+      <p:sp>
+        <p:nvSpPr>
+          <p:cNvPr id="36" name="TextBox 35">
+            <a:extLst>
+              <a:ext uri="{FF2B5EF4-FFF2-40B4-BE49-F238E27FC236}">
+                <a16:creationId xmlns:a16="http://schemas.microsoft.com/office/drawing/2014/main" id="{EBAAF573-E745-D404-17BF-48D20881A97D}"/>
+              </a:ext>
+            </a:extLst>
+          </p:cNvPr>
+          <p:cNvSpPr txBox="1"/>
+          <p:nvPr/>
+        </p:nvSpPr>
+        <p:spPr>
+          <a:xfrm>
+            <a:off x="2693483" y="2958149"/>
+            <a:ext cx="2029527" cy="2069093"/>
+          </a:xfrm>
+          <a:prstGeom prst="rect">
+            <a:avLst/>
+          </a:prstGeom>
+          <a:noFill/>
+        </p:spPr>
+        <p:txBody>
+          <a:bodyPr wrap="square" rtlCol="0">
+            <a:spAutoFit/>
+          </a:bodyPr>
+          <a:lstStyle/>
+          <a:p>
+            <a:pPr algn="ctr">
+              <a:lnSpc>
+                <a:spcPts val="1400"/>
+              </a:lnSpc>
+            </a:pPr>
+            <a:endParaRPr lang="en-US" sz="1400" dirty="0">
+              <a:solidFill>
+                <a:schemeClr val="tx2"/>
+              </a:solidFill>
+              <a:latin typeface="Source Sans Pro" charset="0"/>
+              <a:ea typeface="Source Sans Pro" charset="0"/>
+              <a:cs typeface="Source Sans Pro" charset="0"/>
+            </a:endParaRPr>
+          </a:p>
+          <a:p>
+            <a:pPr algn="ctr">
+              <a:lnSpc>
+                <a:spcPts val="1400"/>
+              </a:lnSpc>
+            </a:pPr>
+            <a:r>
+              <a:rPr lang="en-US" sz="1400" dirty="0">
+                <a:solidFill>
+                  <a:schemeClr val="tx2"/>
+                </a:solidFill>
+                <a:latin typeface="Source Sans Pro" charset="0"/>
+                <a:ea typeface="Source Sans Pro" charset="0"/>
+                <a:cs typeface="Source Sans Pro" charset="0"/>
+              </a:rPr>
+              <a:t>Local Deploy</a:t>
+            </a:r>
+          </a:p>
+          <a:p>
+            <a:pPr algn="ctr">
+              <a:lnSpc>
+                <a:spcPts val="1400"/>
+              </a:lnSpc>
+            </a:pPr>
+            <a:endParaRPr lang="en-US" sz="1400" dirty="0">
+              <a:solidFill>
+                <a:schemeClr val="tx2"/>
+              </a:solidFill>
+              <a:latin typeface="Source Sans Pro" charset="0"/>
+              <a:ea typeface="Source Sans Pro" charset="0"/>
+              <a:cs typeface="Source Sans Pro" charset="0"/>
+            </a:endParaRPr>
+          </a:p>
+          <a:p>
+            <a:pPr algn="ctr">
+              <a:lnSpc>
+                <a:spcPts val="1400"/>
+              </a:lnSpc>
+            </a:pPr>
+            <a:endParaRPr lang="en-US" sz="1400" dirty="0">
+              <a:solidFill>
+                <a:schemeClr val="tx2"/>
+              </a:solidFill>
+              <a:latin typeface="Source Sans Pro" charset="0"/>
+              <a:ea typeface="Source Sans Pro" charset="0"/>
+              <a:cs typeface="Source Sans Pro" charset="0"/>
+            </a:endParaRPr>
+          </a:p>
+          <a:p>
+            <a:pPr algn="ctr">
+              <a:lnSpc>
+                <a:spcPts val="1400"/>
+              </a:lnSpc>
+            </a:pPr>
+            <a:endParaRPr lang="en-US" sz="1400" dirty="0">
+              <a:solidFill>
+                <a:schemeClr val="tx2"/>
+              </a:solidFill>
+              <a:latin typeface="Source Sans Pro" charset="0"/>
+              <a:ea typeface="Source Sans Pro" charset="0"/>
+              <a:cs typeface="Source Sans Pro" charset="0"/>
+            </a:endParaRPr>
+          </a:p>
+          <a:p>
+            <a:pPr algn="ctr">
+              <a:lnSpc>
+                <a:spcPts val="1400"/>
+              </a:lnSpc>
+            </a:pPr>
+            <a:endParaRPr lang="en-US" sz="1400" dirty="0">
+              <a:solidFill>
+                <a:schemeClr val="tx2"/>
+              </a:solidFill>
+              <a:latin typeface="Source Sans Pro" charset="0"/>
+              <a:ea typeface="Source Sans Pro" charset="0"/>
+              <a:cs typeface="Source Sans Pro" charset="0"/>
+            </a:endParaRPr>
+          </a:p>
+          <a:p>
+            <a:pPr algn="ctr">
+              <a:lnSpc>
+                <a:spcPts val="1400"/>
+              </a:lnSpc>
+            </a:pPr>
+            <a:endParaRPr lang="en-US" sz="1400" dirty="0">
+              <a:solidFill>
+                <a:schemeClr val="tx2"/>
+              </a:solidFill>
+              <a:latin typeface="Source Sans Pro" charset="0"/>
+              <a:ea typeface="Source Sans Pro" charset="0"/>
+              <a:cs typeface="Source Sans Pro" charset="0"/>
+            </a:endParaRPr>
+          </a:p>
+          <a:p>
+            <a:pPr algn="ctr">
+              <a:lnSpc>
+                <a:spcPts val="1400"/>
+              </a:lnSpc>
+            </a:pPr>
+            <a:endParaRPr lang="en-US" sz="1400" dirty="0">
+              <a:solidFill>
+                <a:schemeClr val="tx2"/>
+              </a:solidFill>
+              <a:latin typeface="Source Sans Pro" charset="0"/>
+              <a:ea typeface="Source Sans Pro" charset="0"/>
+              <a:cs typeface="Source Sans Pro" charset="0"/>
+            </a:endParaRPr>
+          </a:p>
+          <a:p>
+            <a:pPr algn="ctr">
+              <a:lnSpc>
+                <a:spcPts val="1400"/>
+              </a:lnSpc>
+            </a:pPr>
+            <a:endParaRPr lang="en-US" sz="1400" dirty="0">
+              <a:solidFill>
+                <a:schemeClr val="tx2"/>
+              </a:solidFill>
+              <a:latin typeface="Source Sans Pro" charset="0"/>
+              <a:ea typeface="Source Sans Pro" charset="0"/>
+              <a:cs typeface="Source Sans Pro" charset="0"/>
+            </a:endParaRPr>
+          </a:p>
+          <a:p>
+            <a:pPr algn="ctr">
+              <a:lnSpc>
+                <a:spcPts val="1400"/>
+              </a:lnSpc>
+            </a:pPr>
+            <a:r>
+              <a:rPr lang="en-US" sz="1400" dirty="0">
+                <a:solidFill>
+                  <a:schemeClr val="tx2"/>
+                </a:solidFill>
+                <a:latin typeface="Source Sans Pro" charset="0"/>
+                <a:ea typeface="Source Sans Pro" charset="0"/>
+                <a:cs typeface="Source Sans Pro" charset="0"/>
+              </a:rPr>
+              <a:t>Dynamic </a:t>
+            </a:r>
+            <a:br>
+              <a:rPr lang="en-US" sz="1400" dirty="0">
+                <a:solidFill>
+                  <a:schemeClr val="tx2"/>
+                </a:solidFill>
+                <a:latin typeface="Source Sans Pro" charset="0"/>
+                <a:ea typeface="Source Sans Pro" charset="0"/>
+                <a:cs typeface="Source Sans Pro" charset="0"/>
+              </a:rPr>
+            </a:br>
+            <a:r>
+              <a:rPr lang="en-US" sz="1400" dirty="0">
+                <a:solidFill>
+                  <a:schemeClr val="tx2"/>
+                </a:solidFill>
+                <a:latin typeface="Source Sans Pro" charset="0"/>
+                <a:ea typeface="Source Sans Pro" charset="0"/>
+                <a:cs typeface="Source Sans Pro" charset="0"/>
+              </a:rPr>
+              <a:t> code injection</a:t>
+            </a:r>
+          </a:p>
+        </p:txBody>
+      </p:sp>
+      <p:pic>
+        <p:nvPicPr>
+          <p:cNvPr id="42" name="Picture 41">
+            <a:extLst>
+              <a:ext uri="{FF2B5EF4-FFF2-40B4-BE49-F238E27FC236}">
+                <a16:creationId xmlns:a16="http://schemas.microsoft.com/office/drawing/2014/main" id="{F7770D82-B29F-FBED-391E-EC44C819306D}"/>
+              </a:ext>
+            </a:extLst>
+          </p:cNvPr>
+          <p:cNvPicPr>
+            <a:picLocks noChangeAspect="1"/>
+          </p:cNvPicPr>
+          <p:nvPr/>
+        </p:nvPicPr>
+        <p:blipFill>
+          <a:blip r:embed="rId6"/>
+          <a:stretch>
+            <a:fillRect/>
+          </a:stretch>
+        </p:blipFill>
+        <p:spPr>
+          <a:xfrm>
+            <a:off x="330981" y="2836348"/>
+            <a:ext cx="2542420" cy="2037972"/>
+          </a:xfrm>
+          <a:prstGeom prst="rect">
+            <a:avLst/>
+          </a:prstGeom>
+        </p:spPr>
+      </p:pic>
+      <p:pic>
+        <p:nvPicPr>
+          <p:cNvPr id="46" name="Picture 45">
+            <a:extLst>
+              <a:ext uri="{FF2B5EF4-FFF2-40B4-BE49-F238E27FC236}">
+                <a16:creationId xmlns:a16="http://schemas.microsoft.com/office/drawing/2014/main" id="{AEAEA7C3-886B-6E78-C148-BF64FFFC6863}"/>
+              </a:ext>
+            </a:extLst>
+          </p:cNvPr>
+          <p:cNvPicPr>
+            <a:picLocks noChangeAspect="1"/>
+          </p:cNvPicPr>
+          <p:nvPr/>
+        </p:nvPicPr>
+        <p:blipFill>
+          <a:blip r:embed="rId7"/>
+          <a:srcRect r="14917" b="2993"/>
+          <a:stretch/>
+        </p:blipFill>
+        <p:spPr>
+          <a:xfrm>
+            <a:off x="538360" y="2991319"/>
+            <a:ext cx="2127662" cy="1263181"/>
+          </a:xfrm>
+          <a:prstGeom prst="rect">
+            <a:avLst/>
+          </a:prstGeom>
+        </p:spPr>
+      </p:pic>
+      <p:pic>
+        <p:nvPicPr>
+          <p:cNvPr id="44" name="Picture 43">
+            <a:extLst>
+              <a:ext uri="{FF2B5EF4-FFF2-40B4-BE49-F238E27FC236}">
+                <a16:creationId xmlns:a16="http://schemas.microsoft.com/office/drawing/2014/main" id="{E0E4F2E0-9CF4-20E8-2E9F-0BA254B24C7E}"/>
+              </a:ext>
+            </a:extLst>
+          </p:cNvPr>
+          <p:cNvPicPr>
+            <a:picLocks noChangeAspect="1"/>
+          </p:cNvPicPr>
+          <p:nvPr/>
+        </p:nvPicPr>
+        <p:blipFill>
+          <a:blip r:embed="rId8" cstate="print">
+            <a:extLst>
+              <a:ext uri="{28A0092B-C50C-407E-A947-70E740481C1C}">
+                <a14:useLocalDpi xmlns:a14="http://schemas.microsoft.com/office/drawing/2010/main" val="0"/>
+              </a:ext>
+            </a:extLst>
+          </a:blip>
+          <a:stretch>
+            <a:fillRect/>
+          </a:stretch>
+        </p:blipFill>
+        <p:spPr>
+          <a:xfrm>
+            <a:off x="593366" y="3032977"/>
+            <a:ext cx="320594" cy="302831"/>
+          </a:xfrm>
+          <a:prstGeom prst="rect">
+            <a:avLst/>
+          </a:prstGeom>
+        </p:spPr>
+      </p:pic>
+      <p:sp>
+        <p:nvSpPr>
+          <p:cNvPr id="49" name="TextBox 48">
+            <a:extLst>
+              <a:ext uri="{FF2B5EF4-FFF2-40B4-BE49-F238E27FC236}">
+                <a16:creationId xmlns:a16="http://schemas.microsoft.com/office/drawing/2014/main" id="{2F885045-9AEA-88AB-6701-94459459EAC3}"/>
+              </a:ext>
+            </a:extLst>
+          </p:cNvPr>
+          <p:cNvSpPr txBox="1"/>
+          <p:nvPr/>
+        </p:nvSpPr>
+        <p:spPr>
+          <a:xfrm>
+            <a:off x="4341595" y="446960"/>
+            <a:ext cx="2436179" cy="1200329"/>
+          </a:xfrm>
+          <a:prstGeom prst="rect">
+            <a:avLst/>
+          </a:prstGeom>
+          <a:noFill/>
+        </p:spPr>
+        <p:txBody>
+          <a:bodyPr wrap="square">
+            <a:spAutoFit/>
+          </a:bodyPr>
+          <a:lstStyle/>
+          <a:p>
+            <a:pPr algn="ctr"/>
+            <a:r>
+              <a:rPr lang="en-US" b="1" dirty="0">
+                <a:solidFill>
+                  <a:schemeClr val="tx2"/>
+                </a:solidFill>
+                <a:latin typeface="Source Sans Pro" charset="0"/>
+                <a:ea typeface="Source Sans Pro" charset="0"/>
+                <a:cs typeface="Source Sans Pro" charset="0"/>
+              </a:rPr>
+              <a:t>Multi-Sandbox Executable </a:t>
+            </a:r>
+            <a:br>
+              <a:rPr lang="en-US" b="1" dirty="0">
+                <a:solidFill>
+                  <a:schemeClr val="tx2"/>
+                </a:solidFill>
+                <a:latin typeface="Source Sans Pro" charset="0"/>
+                <a:ea typeface="Source Sans Pro" charset="0"/>
+                <a:cs typeface="Source Sans Pro" charset="0"/>
+              </a:rPr>
+            </a:br>
+            <a:r>
+              <a:rPr lang="en-US" b="1" dirty="0">
+                <a:solidFill>
+                  <a:schemeClr val="tx2"/>
+                </a:solidFill>
+                <a:latin typeface="Source Sans Pro" charset="0"/>
+                <a:ea typeface="Source Sans Pro" charset="0"/>
+                <a:cs typeface="Source Sans Pro" charset="0"/>
+              </a:rPr>
+              <a:t>running on </a:t>
+            </a:r>
+            <a:br>
+              <a:rPr lang="en-US" b="1" dirty="0">
+                <a:solidFill>
+                  <a:schemeClr val="tx2"/>
+                </a:solidFill>
+                <a:latin typeface="Source Sans Pro" charset="0"/>
+                <a:ea typeface="Source Sans Pro" charset="0"/>
+                <a:cs typeface="Source Sans Pro" charset="0"/>
+              </a:rPr>
+            </a:br>
+            <a:r>
+              <a:rPr lang="en-US" b="1" dirty="0">
+                <a:solidFill>
+                  <a:schemeClr val="tx2"/>
+                </a:solidFill>
+                <a:latin typeface="Source Sans Pro" charset="0"/>
+                <a:ea typeface="Source Sans Pro" charset="0"/>
+                <a:cs typeface="Source Sans Pro" charset="0"/>
+              </a:rPr>
+              <a:t>NXP i.MXRT1170</a:t>
+            </a:r>
+          </a:p>
+        </p:txBody>
+      </p:sp>
+      <p:pic>
+        <p:nvPicPr>
+          <p:cNvPr id="54" name="Picture 53">
+            <a:extLst>
+              <a:ext uri="{FF2B5EF4-FFF2-40B4-BE49-F238E27FC236}">
+                <a16:creationId xmlns:a16="http://schemas.microsoft.com/office/drawing/2014/main" id="{07B53305-C41B-97BD-7719-0A19506A9928}"/>
+              </a:ext>
+            </a:extLst>
+          </p:cNvPr>
+          <p:cNvPicPr>
+            <a:picLocks noChangeAspect="1"/>
+          </p:cNvPicPr>
+          <p:nvPr/>
+        </p:nvPicPr>
+        <p:blipFill>
+          <a:blip r:embed="rId9" cstate="print">
+            <a:extLst>
+              <a:ext uri="{28A0092B-C50C-407E-A947-70E740481C1C}">
+                <a14:useLocalDpi xmlns:a14="http://schemas.microsoft.com/office/drawing/2010/main" val="0"/>
+              </a:ext>
+            </a:extLst>
+          </a:blip>
+          <a:stretch>
+            <a:fillRect/>
+          </a:stretch>
+        </p:blipFill>
+        <p:spPr>
+          <a:xfrm>
+            <a:off x="9358334" y="415745"/>
+            <a:ext cx="1264193" cy="805291"/>
+          </a:xfrm>
+          <a:prstGeom prst="rect">
+            <a:avLst/>
+          </a:prstGeom>
+        </p:spPr>
+      </p:pic>
+      <p:sp>
+        <p:nvSpPr>
+          <p:cNvPr id="55" name="TextBox 54">
+            <a:extLst>
+              <a:ext uri="{FF2B5EF4-FFF2-40B4-BE49-F238E27FC236}">
+                <a16:creationId xmlns:a16="http://schemas.microsoft.com/office/drawing/2014/main" id="{CF4FEDFD-5536-3770-CBE7-AF61FCEDA969}"/>
+              </a:ext>
+            </a:extLst>
+          </p:cNvPr>
+          <p:cNvSpPr txBox="1"/>
+          <p:nvPr/>
+        </p:nvSpPr>
+        <p:spPr>
+          <a:xfrm>
+            <a:off x="8730172" y="1222477"/>
+            <a:ext cx="2552469" cy="287130"/>
+          </a:xfrm>
+          <a:prstGeom prst="rect">
+            <a:avLst/>
+          </a:prstGeom>
+          <a:noFill/>
+        </p:spPr>
+        <p:txBody>
+          <a:bodyPr wrap="square" rtlCol="0">
+            <a:spAutoFit/>
+          </a:bodyPr>
+          <a:lstStyle/>
+          <a:p>
+            <a:pPr algn="ctr">
+              <a:lnSpc>
+                <a:spcPts val="1400"/>
+              </a:lnSpc>
+            </a:pPr>
+            <a:r>
+              <a:rPr lang="en-US" b="1" dirty="0">
+                <a:solidFill>
+                  <a:schemeClr val="tx2"/>
+                </a:solidFill>
+                <a:latin typeface="Source Sans Pro" charset="0"/>
+                <a:ea typeface="Source Sans Pro" charset="0"/>
+                <a:cs typeface="Source Sans Pro" charset="0"/>
+              </a:rPr>
+              <a:t>App Administrator</a:t>
+            </a:r>
+          </a:p>
+        </p:txBody>
+      </p:sp>
+      <p:sp>
+        <p:nvSpPr>
+          <p:cNvPr id="76" name="Rectangle: Top Corners Rounded 75">
+            <a:extLst>
+              <a:ext uri="{FF2B5EF4-FFF2-40B4-BE49-F238E27FC236}">
+                <a16:creationId xmlns:a16="http://schemas.microsoft.com/office/drawing/2014/main" id="{77607BD0-C2C4-8F88-7AD8-CC86E44D02BF}"/>
+              </a:ext>
+            </a:extLst>
+          </p:cNvPr>
+          <p:cNvSpPr/>
+          <p:nvPr/>
+        </p:nvSpPr>
+        <p:spPr>
+          <a:xfrm rot="10800000">
+            <a:off x="4824157" y="2672241"/>
+            <a:ext cx="1397709" cy="176823"/>
+          </a:xfrm>
+          <a:prstGeom prst="round2SameRect">
+            <a:avLst>
+              <a:gd name="adj1" fmla="val 50000"/>
+              <a:gd name="adj2" fmla="val 0"/>
+            </a:avLst>
+          </a:prstGeom>
+          <a:solidFill>
+            <a:srgbClr val="EFEFEF"/>
+          </a:solidFill>
+          <a:ln w="12700">
+            <a:solidFill>
+              <a:schemeClr val="accent1"/>
+            </a:solidFill>
+          </a:ln>
+        </p:spPr>
+        <p:style>
+          <a:lnRef idx="2">
+            <a:schemeClr val="accent1">
+              <a:shade val="50000"/>
+            </a:schemeClr>
+          </a:lnRef>
+          <a:fillRef idx="1">
+            <a:schemeClr val="accent1"/>
+          </a:fillRef>
+          <a:effectRef idx="0">
+            <a:schemeClr val="accent1"/>
+          </a:effectRef>
+          <a:fontRef idx="minor">
+            <a:schemeClr val="lt1"/>
+          </a:fontRef>
+        </p:style>
+        <p:txBody>
+          <a:bodyPr rtlCol="0" anchor="ctr"/>
+          <a:lstStyle/>
+          <a:p>
+            <a:pPr algn="ctr"/>
+            <a:endParaRPr lang="en-US">
+              <a:solidFill>
+                <a:schemeClr val="tx2"/>
+              </a:solidFill>
+            </a:endParaRPr>
+          </a:p>
+        </p:txBody>
+      </p:sp>
+      <p:pic>
+        <p:nvPicPr>
+          <p:cNvPr id="58" name="Picture 57">
+            <a:extLst>
+              <a:ext uri="{FF2B5EF4-FFF2-40B4-BE49-F238E27FC236}">
+                <a16:creationId xmlns:a16="http://schemas.microsoft.com/office/drawing/2014/main" id="{0371D039-8225-F694-F257-D0A0A1503951}"/>
+              </a:ext>
+            </a:extLst>
+          </p:cNvPr>
+          <p:cNvPicPr>
+            <a:picLocks noChangeAspect="1"/>
+          </p:cNvPicPr>
+          <p:nvPr/>
+        </p:nvPicPr>
+        <p:blipFill>
+          <a:blip r:embed="rId10"/>
+          <a:srcRect l="18644" t="38499" r="21224"/>
+          <a:stretch/>
+        </p:blipFill>
+        <p:spPr>
+          <a:xfrm>
+            <a:off x="4895849" y="2763019"/>
+            <a:ext cx="1251716" cy="815483"/>
+          </a:xfrm>
+          <a:prstGeom prst="rect">
+            <a:avLst/>
+          </a:prstGeom>
+        </p:spPr>
+      </p:pic>
+      <p:sp>
+        <p:nvSpPr>
+          <p:cNvPr id="70" name="Right Bracket 69">
+            <a:extLst>
+              <a:ext uri="{FF2B5EF4-FFF2-40B4-BE49-F238E27FC236}">
+                <a16:creationId xmlns:a16="http://schemas.microsoft.com/office/drawing/2014/main" id="{FA8F763A-2C81-E7FD-8E1F-9539237D64E4}"/>
+              </a:ext>
+            </a:extLst>
+          </p:cNvPr>
+          <p:cNvSpPr/>
+          <p:nvPr/>
+        </p:nvSpPr>
+        <p:spPr>
+          <a:xfrm rot="5400000">
+            <a:off x="4931086" y="2501869"/>
+            <a:ext cx="158750" cy="372607"/>
+          </a:xfrm>
+          <a:prstGeom prst="rightBracket">
+            <a:avLst/>
+          </a:prstGeom>
+          <a:solidFill>
+            <a:schemeClr val="bg1"/>
+          </a:solidFill>
+          <a:ln w="12700"/>
+        </p:spPr>
+        <p:style>
+          <a:lnRef idx="1">
+            <a:schemeClr val="accent1"/>
+          </a:lnRef>
+          <a:fillRef idx="0">
+            <a:schemeClr val="accent1"/>
+          </a:fillRef>
+          <a:effectRef idx="0">
+            <a:schemeClr val="accent1"/>
+          </a:effectRef>
+          <a:fontRef idx="minor">
+            <a:schemeClr val="tx1"/>
+          </a:fontRef>
+        </p:style>
+        <p:txBody>
+          <a:bodyPr rtlCol="0" anchor="ctr"/>
+          <a:lstStyle/>
+          <a:p>
+            <a:pPr algn="ctr"/>
+            <a:endParaRPr lang="en-US">
+              <a:solidFill>
+                <a:schemeClr val="tx2"/>
+              </a:solidFill>
+            </a:endParaRPr>
+          </a:p>
+        </p:txBody>
+      </p:sp>
+      <p:sp>
+        <p:nvSpPr>
+          <p:cNvPr id="72" name="Right Bracket 71">
+            <a:extLst>
+              <a:ext uri="{FF2B5EF4-FFF2-40B4-BE49-F238E27FC236}">
+                <a16:creationId xmlns:a16="http://schemas.microsoft.com/office/drawing/2014/main" id="{BEE8DEC2-1372-618F-838E-0320CC18D89E}"/>
+              </a:ext>
+            </a:extLst>
+          </p:cNvPr>
+          <p:cNvSpPr/>
+          <p:nvPr/>
+        </p:nvSpPr>
+        <p:spPr>
+          <a:xfrm rot="5400000">
+            <a:off x="5474675" y="2513025"/>
+            <a:ext cx="158750" cy="372607"/>
+          </a:xfrm>
+          <a:prstGeom prst="rightBracket">
+            <a:avLst/>
+          </a:prstGeom>
+          <a:solidFill>
+            <a:schemeClr val="bg1"/>
+          </a:solidFill>
+          <a:ln w="12700"/>
+        </p:spPr>
+        <p:style>
+          <a:lnRef idx="1">
+            <a:schemeClr val="accent1"/>
+          </a:lnRef>
+          <a:fillRef idx="0">
+            <a:schemeClr val="accent1"/>
+          </a:fillRef>
+          <a:effectRef idx="0">
+            <a:schemeClr val="accent1"/>
+          </a:effectRef>
+          <a:fontRef idx="minor">
+            <a:schemeClr val="tx1"/>
+          </a:fontRef>
+        </p:style>
+        <p:txBody>
+          <a:bodyPr rtlCol="0" anchor="ctr"/>
+          <a:lstStyle/>
+          <a:p>
+            <a:pPr algn="ctr"/>
+            <a:endParaRPr lang="en-US">
+              <a:solidFill>
+                <a:schemeClr val="tx2"/>
+              </a:solidFill>
+            </a:endParaRPr>
+          </a:p>
+        </p:txBody>
+      </p:sp>
+      <p:sp>
+        <p:nvSpPr>
+          <p:cNvPr id="73" name="Right Bracket 72">
+            <a:extLst>
+              <a:ext uri="{FF2B5EF4-FFF2-40B4-BE49-F238E27FC236}">
+                <a16:creationId xmlns:a16="http://schemas.microsoft.com/office/drawing/2014/main" id="{7FA8CC85-4CFC-9EFF-0764-4B11E15E7C16}"/>
+              </a:ext>
+            </a:extLst>
+          </p:cNvPr>
+          <p:cNvSpPr/>
+          <p:nvPr/>
+        </p:nvSpPr>
+        <p:spPr>
+          <a:xfrm rot="5400000">
+            <a:off x="5956187" y="2515203"/>
+            <a:ext cx="158750" cy="372607"/>
+          </a:xfrm>
+          <a:prstGeom prst="rightBracket">
+            <a:avLst/>
+          </a:prstGeom>
+          <a:solidFill>
+            <a:schemeClr val="bg1"/>
+          </a:solidFill>
+          <a:ln w="12700"/>
+        </p:spPr>
+        <p:style>
+          <a:lnRef idx="1">
+            <a:schemeClr val="accent1"/>
+          </a:lnRef>
+          <a:fillRef idx="0">
+            <a:schemeClr val="accent1"/>
+          </a:fillRef>
+          <a:effectRef idx="0">
+            <a:schemeClr val="accent1"/>
+          </a:effectRef>
+          <a:fontRef idx="minor">
+            <a:schemeClr val="tx1"/>
+          </a:fontRef>
+        </p:style>
+        <p:txBody>
+          <a:bodyPr rtlCol="0" anchor="ctr"/>
+          <a:lstStyle/>
+          <a:p>
+            <a:pPr algn="ctr"/>
+            <a:endParaRPr lang="en-US">
+              <a:solidFill>
+                <a:schemeClr val="tx2"/>
+              </a:solidFill>
+            </a:endParaRPr>
+          </a:p>
+        </p:txBody>
+      </p:sp>
+      <p:pic>
+        <p:nvPicPr>
+          <p:cNvPr id="66" name="Picture 65">
+            <a:extLst>
+              <a:ext uri="{FF2B5EF4-FFF2-40B4-BE49-F238E27FC236}">
+                <a16:creationId xmlns:a16="http://schemas.microsoft.com/office/drawing/2014/main" id="{4855D4A1-7047-EB36-588B-8143B8B157BE}"/>
+              </a:ext>
+            </a:extLst>
+          </p:cNvPr>
+          <p:cNvPicPr>
+            <a:picLocks noChangeAspect="1"/>
+          </p:cNvPicPr>
+          <p:nvPr/>
+        </p:nvPicPr>
+        <p:blipFill>
+          <a:blip r:embed="rId11"/>
+          <a:stretch>
+            <a:fillRect/>
+          </a:stretch>
+        </p:blipFill>
+        <p:spPr>
+          <a:xfrm>
+            <a:off x="4792151" y="2171008"/>
+            <a:ext cx="452231" cy="512009"/>
+          </a:xfrm>
+          <a:prstGeom prst="rect">
+            <a:avLst/>
+          </a:prstGeom>
+        </p:spPr>
+      </p:pic>
+      <p:sp>
+        <p:nvSpPr>
+          <p:cNvPr id="67" name="TextBox 66">
+            <a:extLst>
+              <a:ext uri="{FF2B5EF4-FFF2-40B4-BE49-F238E27FC236}">
+                <a16:creationId xmlns:a16="http://schemas.microsoft.com/office/drawing/2014/main" id="{ACA71309-18D1-2CCF-ECA5-BC3826309189}"/>
+              </a:ext>
+            </a:extLst>
+          </p:cNvPr>
+          <p:cNvSpPr txBox="1"/>
+          <p:nvPr/>
+        </p:nvSpPr>
+        <p:spPr>
+          <a:xfrm>
+            <a:off x="4708286" y="2279230"/>
+            <a:ext cx="604353" cy="323165"/>
+          </a:xfrm>
+          <a:prstGeom prst="rect">
+            <a:avLst/>
+          </a:prstGeom>
+          <a:noFill/>
+        </p:spPr>
+        <p:txBody>
+          <a:bodyPr vert="horz" wrap="square" lIns="0" tIns="0" rIns="0" bIns="0" numCol="1" spcCol="288000" rtlCol="0" anchor="t" anchorCtr="0">
+            <a:spAutoFit/>
+          </a:bodyPr>
+          <a:lstStyle/>
+          <a:p>
+            <a:pPr algn="ctr">
+              <a:spcBef>
+                <a:spcPts val="0"/>
+              </a:spcBef>
+              <a:spcAft>
+                <a:spcPts val="600"/>
+              </a:spcAft>
+            </a:pPr>
+            <a:r>
+              <a:rPr lang="en-US" sz="1050" b="1" i="0" spc="0" dirty="0">
+                <a:ln>
+                  <a:noFill/>
+                </a:ln>
+                <a:solidFill>
+                  <a:schemeClr val="tx2"/>
+                </a:solidFill>
+                <a:latin typeface="Source Sans Pro Light" charset="0"/>
+                <a:ea typeface="Source Sans Pro Light" charset="0"/>
+                <a:cs typeface="Source Sans Pro Light" charset="0"/>
+              </a:rPr>
+              <a:t>GUI</a:t>
+            </a:r>
+            <a:br>
+              <a:rPr lang="en-US" sz="1050" b="1" i="0" spc="0" dirty="0">
+                <a:ln>
+                  <a:noFill/>
+                </a:ln>
+                <a:solidFill>
+                  <a:schemeClr val="tx2"/>
+                </a:solidFill>
+                <a:latin typeface="Source Sans Pro Light" charset="0"/>
+                <a:ea typeface="Source Sans Pro Light" charset="0"/>
+                <a:cs typeface="Source Sans Pro Light" charset="0"/>
+              </a:rPr>
+            </a:br>
+            <a:r>
+              <a:rPr lang="en-US" sz="1050" b="1" i="0" spc="0" dirty="0">
+                <a:ln>
+                  <a:noFill/>
+                </a:ln>
+                <a:solidFill>
+                  <a:schemeClr val="tx2"/>
+                </a:solidFill>
+                <a:latin typeface="Source Sans Pro Light" charset="0"/>
+                <a:ea typeface="Source Sans Pro Light" charset="0"/>
+                <a:cs typeface="Source Sans Pro Light" charset="0"/>
+              </a:rPr>
+              <a:t>App</a:t>
+            </a:r>
+          </a:p>
+        </p:txBody>
+      </p:sp>
+      <p:pic>
+        <p:nvPicPr>
+          <p:cNvPr id="64" name="Picture 63">
+            <a:extLst>
+              <a:ext uri="{FF2B5EF4-FFF2-40B4-BE49-F238E27FC236}">
+                <a16:creationId xmlns:a16="http://schemas.microsoft.com/office/drawing/2014/main" id="{69C5D2B3-6EF3-A56B-5A14-BA6FFF5A2F34}"/>
+              </a:ext>
+            </a:extLst>
+          </p:cNvPr>
+          <p:cNvPicPr>
+            <a:picLocks noChangeAspect="1"/>
+          </p:cNvPicPr>
+          <p:nvPr/>
+        </p:nvPicPr>
+        <p:blipFill>
+          <a:blip r:embed="rId11"/>
+          <a:stretch>
+            <a:fillRect/>
+          </a:stretch>
+        </p:blipFill>
+        <p:spPr>
+          <a:xfrm>
+            <a:off x="5328042" y="2161231"/>
+            <a:ext cx="452231" cy="512009"/>
+          </a:xfrm>
+          <a:prstGeom prst="rect">
+            <a:avLst/>
+          </a:prstGeom>
+        </p:spPr>
+      </p:pic>
+      <p:pic>
+        <p:nvPicPr>
+          <p:cNvPr id="68" name="Picture 67">
+            <a:extLst>
+              <a:ext uri="{FF2B5EF4-FFF2-40B4-BE49-F238E27FC236}">
+                <a16:creationId xmlns:a16="http://schemas.microsoft.com/office/drawing/2014/main" id="{07FA2CA2-C2CD-586C-13FD-E52DD659D43B}"/>
+              </a:ext>
+            </a:extLst>
+          </p:cNvPr>
+          <p:cNvPicPr>
+            <a:picLocks noChangeAspect="1"/>
+          </p:cNvPicPr>
+          <p:nvPr/>
+        </p:nvPicPr>
+        <p:blipFill>
+          <a:blip r:embed="rId11"/>
+          <a:stretch>
+            <a:fillRect/>
+          </a:stretch>
+        </p:blipFill>
+        <p:spPr>
+          <a:xfrm>
+            <a:off x="5810694" y="2160234"/>
+            <a:ext cx="452231" cy="512009"/>
+          </a:xfrm>
+          <a:prstGeom prst="rect">
+            <a:avLst/>
+          </a:prstGeom>
+        </p:spPr>
+      </p:pic>
+      <p:sp>
+        <p:nvSpPr>
+          <p:cNvPr id="65" name="TextBox 64">
+            <a:extLst>
+              <a:ext uri="{FF2B5EF4-FFF2-40B4-BE49-F238E27FC236}">
+                <a16:creationId xmlns:a16="http://schemas.microsoft.com/office/drawing/2014/main" id="{F6585296-EA85-FE1F-4234-1818C5385806}"/>
+              </a:ext>
+            </a:extLst>
+          </p:cNvPr>
+          <p:cNvSpPr txBox="1"/>
+          <p:nvPr/>
+        </p:nvSpPr>
+        <p:spPr>
+          <a:xfrm>
+            <a:off x="5251980" y="2332630"/>
+            <a:ext cx="604353" cy="161583"/>
+          </a:xfrm>
+          <a:prstGeom prst="rect">
+            <a:avLst/>
+          </a:prstGeom>
+          <a:noFill/>
+        </p:spPr>
+        <p:txBody>
+          <a:bodyPr vert="horz" wrap="square" lIns="0" tIns="0" rIns="0" bIns="0" numCol="1" spcCol="288000" rtlCol="0" anchor="t" anchorCtr="0">
+            <a:spAutoFit/>
+          </a:bodyPr>
+          <a:lstStyle/>
+          <a:p>
+            <a:pPr algn="ctr">
+              <a:spcBef>
+                <a:spcPts val="0"/>
+              </a:spcBef>
+              <a:spcAft>
+                <a:spcPts val="600"/>
+              </a:spcAft>
+            </a:pPr>
+            <a:r>
+              <a:rPr lang="en-US" sz="1050" b="1" dirty="0" err="1">
+                <a:solidFill>
+                  <a:schemeClr val="tx2"/>
+                </a:solidFill>
+                <a:latin typeface="Source Sans Pro Light" charset="0"/>
+                <a:ea typeface="Source Sans Pro Light" charset="0"/>
+                <a:cs typeface="Source Sans Pro Light" charset="0"/>
+              </a:rPr>
+              <a:t>MyApp</a:t>
+            </a:r>
+            <a:endParaRPr lang="en-US" sz="1050" b="1" i="0" spc="0" dirty="0">
+              <a:ln>
+                <a:noFill/>
+              </a:ln>
+              <a:solidFill>
+                <a:schemeClr val="tx2"/>
+              </a:solidFill>
+              <a:latin typeface="Source Sans Pro Light" charset="0"/>
+              <a:ea typeface="Source Sans Pro Light" charset="0"/>
+              <a:cs typeface="Source Sans Pro Light" charset="0"/>
+            </a:endParaRPr>
+          </a:p>
+        </p:txBody>
+      </p:sp>
+      <p:sp>
+        <p:nvSpPr>
+          <p:cNvPr id="69" name="TextBox 68">
+            <a:extLst>
+              <a:ext uri="{FF2B5EF4-FFF2-40B4-BE49-F238E27FC236}">
+                <a16:creationId xmlns:a16="http://schemas.microsoft.com/office/drawing/2014/main" id="{424070C5-0016-41AA-91BF-BA1193AC551D}"/>
+              </a:ext>
+            </a:extLst>
+          </p:cNvPr>
+          <p:cNvSpPr txBox="1"/>
+          <p:nvPr/>
+        </p:nvSpPr>
+        <p:spPr>
+          <a:xfrm>
+            <a:off x="5726829" y="2268456"/>
+            <a:ext cx="604353" cy="323165"/>
+          </a:xfrm>
+          <a:prstGeom prst="rect">
+            <a:avLst/>
+          </a:prstGeom>
+          <a:noFill/>
+        </p:spPr>
+        <p:txBody>
+          <a:bodyPr vert="horz" wrap="square" lIns="0" tIns="0" rIns="0" bIns="0" numCol="1" spcCol="288000" rtlCol="0" anchor="t" anchorCtr="0">
+            <a:spAutoFit/>
+          </a:bodyPr>
+          <a:lstStyle/>
+          <a:p>
+            <a:pPr algn="ctr">
+              <a:spcBef>
+                <a:spcPts val="0"/>
+              </a:spcBef>
+              <a:spcAft>
+                <a:spcPts val="600"/>
+              </a:spcAft>
+            </a:pPr>
+            <a:r>
+              <a:rPr lang="en-US" sz="1050" b="1" i="0" spc="0" dirty="0">
+                <a:ln>
+                  <a:noFill/>
+                </a:ln>
+                <a:solidFill>
+                  <a:schemeClr val="tx2"/>
+                </a:solidFill>
+                <a:latin typeface="Source Sans Pro Light" charset="0"/>
+                <a:ea typeface="Source Sans Pro Light" charset="0"/>
+                <a:cs typeface="Source Sans Pro Light" charset="0"/>
+              </a:rPr>
+              <a:t>MQTT</a:t>
+            </a:r>
+            <a:br>
+              <a:rPr lang="en-US" sz="1050" b="1" i="0" spc="0" dirty="0">
+                <a:ln>
+                  <a:noFill/>
+                </a:ln>
+                <a:solidFill>
+                  <a:schemeClr val="tx2"/>
+                </a:solidFill>
+                <a:latin typeface="Source Sans Pro Light" charset="0"/>
+                <a:ea typeface="Source Sans Pro Light" charset="0"/>
+                <a:cs typeface="Source Sans Pro Light" charset="0"/>
+              </a:rPr>
+            </a:br>
+            <a:r>
+              <a:rPr lang="en-US" sz="1050" b="1" i="0" spc="0" dirty="0">
+                <a:ln>
+                  <a:noFill/>
+                </a:ln>
+                <a:solidFill>
+                  <a:schemeClr val="tx2"/>
+                </a:solidFill>
+                <a:latin typeface="Source Sans Pro Light" charset="0"/>
+                <a:ea typeface="Source Sans Pro Light" charset="0"/>
+                <a:cs typeface="Source Sans Pro Light" charset="0"/>
+              </a:rPr>
+              <a:t>App</a:t>
+            </a:r>
+          </a:p>
+        </p:txBody>
+      </p:sp>
+      <p:cxnSp>
+        <p:nvCxnSpPr>
+          <p:cNvPr id="79" name="Connector: Elbow 78">
+            <a:extLst>
+              <a:ext uri="{FF2B5EF4-FFF2-40B4-BE49-F238E27FC236}">
+                <a16:creationId xmlns:a16="http://schemas.microsoft.com/office/drawing/2014/main" id="{C5845C19-1ED6-C75D-1DD1-626627671877}"/>
+              </a:ext>
+            </a:extLst>
+          </p:cNvPr>
+          <p:cNvCxnSpPr>
+            <a:cxnSpLocks/>
+          </p:cNvCxnSpPr>
+          <p:nvPr/>
+        </p:nvCxnSpPr>
+        <p:spPr>
+          <a:xfrm flipV="1">
+            <a:off x="3112696" y="2494213"/>
+            <a:ext cx="1564926" cy="934787"/>
+          </a:xfrm>
+          <a:prstGeom prst="bentConnector3">
+            <a:avLst>
+              <a:gd name="adj1" fmla="val 71912"/>
+            </a:avLst>
+          </a:prstGeom>
+          <a:ln w="19050">
+            <a:solidFill>
+              <a:srgbClr val="A9B1B5"/>
+            </a:solidFill>
+            <a:tailEnd type="triangle"/>
+          </a:ln>
+        </p:spPr>
+        <p:style>
+          <a:lnRef idx="1">
+            <a:schemeClr val="accent1"/>
+          </a:lnRef>
+          <a:fillRef idx="0">
+            <a:schemeClr val="accent1"/>
+          </a:fillRef>
+          <a:effectRef idx="0">
+            <a:schemeClr val="accent1"/>
+          </a:effectRef>
+          <a:fontRef idx="minor">
+            <a:schemeClr val="tx1"/>
+          </a:fontRef>
+        </p:style>
+      </p:cxnSp>
+      <p:sp>
+        <p:nvSpPr>
+          <p:cNvPr id="83" name="TextBox 82">
+            <a:extLst>
+              <a:ext uri="{FF2B5EF4-FFF2-40B4-BE49-F238E27FC236}">
+                <a16:creationId xmlns:a16="http://schemas.microsoft.com/office/drawing/2014/main" id="{65ACEEA4-0E86-B5EA-F043-8EFD78C6F494}"/>
+              </a:ext>
+            </a:extLst>
+          </p:cNvPr>
+          <p:cNvSpPr txBox="1"/>
+          <p:nvPr/>
+        </p:nvSpPr>
+        <p:spPr>
+          <a:xfrm>
+            <a:off x="385254" y="4892426"/>
+            <a:ext cx="2433874" cy="273729"/>
+          </a:xfrm>
+          <a:prstGeom prst="rect">
+            <a:avLst/>
+          </a:prstGeom>
+          <a:noFill/>
+        </p:spPr>
+        <p:txBody>
+          <a:bodyPr wrap="square" rtlCol="0">
+            <a:spAutoFit/>
+          </a:bodyPr>
+          <a:lstStyle/>
+          <a:p>
+            <a:pPr algn="ctr">
+              <a:lnSpc>
+                <a:spcPts val="1400"/>
+              </a:lnSpc>
+            </a:pPr>
+            <a:r>
+              <a:rPr lang="en-US" sz="1400" b="1" dirty="0">
+                <a:solidFill>
+                  <a:schemeClr val="tx2"/>
+                </a:solidFill>
+                <a:latin typeface="Source Sans Pro" charset="0"/>
+                <a:ea typeface="Source Sans Pro" charset="0"/>
+                <a:cs typeface="Source Sans Pro" charset="0"/>
+              </a:rPr>
+              <a:t>MICROEJ SDK 6</a:t>
+            </a:r>
+            <a:endParaRPr lang="en-US" sz="1200" dirty="0">
+              <a:solidFill>
+                <a:schemeClr val="tx2"/>
+              </a:solidFill>
+              <a:latin typeface="Source Sans Pro" charset="0"/>
+              <a:ea typeface="Source Sans Pro" charset="0"/>
+              <a:cs typeface="Source Sans Pro" charset="0"/>
+            </a:endParaRPr>
+          </a:p>
+        </p:txBody>
+      </p:sp>
+      <p:sp>
+        <p:nvSpPr>
+          <p:cNvPr id="84" name="TextBox 83">
+            <a:extLst>
+              <a:ext uri="{FF2B5EF4-FFF2-40B4-BE49-F238E27FC236}">
+                <a16:creationId xmlns:a16="http://schemas.microsoft.com/office/drawing/2014/main" id="{FB3D7464-6889-C110-3830-6E2AB869B1C6}"/>
+              </a:ext>
+            </a:extLst>
+          </p:cNvPr>
+          <p:cNvSpPr txBox="1"/>
+          <p:nvPr/>
+        </p:nvSpPr>
+        <p:spPr>
+          <a:xfrm>
+            <a:off x="385254" y="5229726"/>
+            <a:ext cx="2433874" cy="1171411"/>
+          </a:xfrm>
+          <a:prstGeom prst="rect">
+            <a:avLst/>
+          </a:prstGeom>
+          <a:noFill/>
+        </p:spPr>
+        <p:txBody>
+          <a:bodyPr wrap="square" rtlCol="0">
+            <a:spAutoFit/>
+          </a:bodyPr>
+          <a:lstStyle/>
+          <a:p>
+            <a:pPr marL="171450" indent="-171450">
+              <a:lnSpc>
+                <a:spcPts val="1400"/>
+              </a:lnSpc>
+              <a:buFont typeface="Arial" panose="020B0604020202020204" pitchFamily="34" charset="0"/>
+              <a:buChar char="•"/>
+            </a:pPr>
+            <a:r>
+              <a:rPr lang="en-US" sz="1400" dirty="0">
+                <a:solidFill>
+                  <a:schemeClr val="tx2"/>
+                </a:solidFill>
+                <a:latin typeface="Source Sans Pro" charset="0"/>
+              </a:rPr>
+              <a:t>Sandboxed Application developed using MICROEJ SDK</a:t>
+            </a:r>
+          </a:p>
+          <a:p>
+            <a:pPr marL="171450" indent="-171450">
+              <a:lnSpc>
+                <a:spcPts val="1400"/>
+              </a:lnSpc>
+              <a:buFont typeface="Arial" panose="020B0604020202020204" pitchFamily="34" charset="0"/>
+              <a:buChar char="•"/>
+            </a:pPr>
+            <a:r>
+              <a:rPr lang="en-US" sz="1400" dirty="0">
+                <a:solidFill>
+                  <a:schemeClr val="tx2"/>
+                </a:solidFill>
+                <a:latin typeface="Source Sans Pro" charset="0"/>
+                <a:ea typeface="Source Sans Pro" charset="0"/>
+                <a:cs typeface="Source Sans Pro" charset="0"/>
+              </a:rPr>
+              <a:t>Can be launched on simulator or deployed dynamically on the device.</a:t>
+            </a:r>
+          </a:p>
+        </p:txBody>
+      </p:sp>
+      <p:pic>
+        <p:nvPicPr>
+          <p:cNvPr id="86" name="Picture 85">
+            <a:extLst>
+              <a:ext uri="{FF2B5EF4-FFF2-40B4-BE49-F238E27FC236}">
+                <a16:creationId xmlns:a16="http://schemas.microsoft.com/office/drawing/2014/main" id="{7E5711DD-2326-53D3-E6F5-16011D57897E}"/>
+              </a:ext>
+            </a:extLst>
+          </p:cNvPr>
+          <p:cNvPicPr>
+            <a:picLocks noChangeAspect="1"/>
+          </p:cNvPicPr>
+          <p:nvPr/>
+        </p:nvPicPr>
+        <p:blipFill>
+          <a:blip r:embed="rId12"/>
+          <a:stretch>
+            <a:fillRect/>
+          </a:stretch>
+        </p:blipFill>
+        <p:spPr>
+          <a:xfrm>
+            <a:off x="8706727" y="1722991"/>
+            <a:ext cx="3257851" cy="2566240"/>
+          </a:xfrm>
+          <a:prstGeom prst="rect">
+            <a:avLst/>
+          </a:prstGeom>
+        </p:spPr>
+      </p:pic>
+      <p:pic>
+        <p:nvPicPr>
+          <p:cNvPr id="9" name="Picture 8">
+            <a:extLst>
+              <a:ext uri="{FF2B5EF4-FFF2-40B4-BE49-F238E27FC236}">
+                <a16:creationId xmlns:a16="http://schemas.microsoft.com/office/drawing/2014/main" id="{CF939CC2-EE74-7413-2C8F-2EA0994DEB6A}"/>
+              </a:ext>
+            </a:extLst>
+          </p:cNvPr>
+          <p:cNvPicPr>
+            <a:picLocks noChangeAspect="1"/>
+          </p:cNvPicPr>
+          <p:nvPr/>
+        </p:nvPicPr>
+        <p:blipFill>
+          <a:blip r:embed="rId13"/>
+          <a:stretch>
+            <a:fillRect/>
+          </a:stretch>
+        </p:blipFill>
+        <p:spPr>
+          <a:xfrm>
+            <a:off x="1648903" y="3184392"/>
+            <a:ext cx="678080" cy="1070145"/>
+          </a:xfrm>
+          <a:prstGeom prst="rect">
+            <a:avLst/>
+          </a:prstGeom>
+          <a:ln>
+            <a:solidFill>
+              <a:schemeClr val="bg1"/>
+            </a:solidFill>
+          </a:ln>
+        </p:spPr>
+      </p:pic>
+      <p:pic>
+        <p:nvPicPr>
+          <p:cNvPr id="14" name="Picture 13">
+            <a:extLst>
+              <a:ext uri="{FF2B5EF4-FFF2-40B4-BE49-F238E27FC236}">
+                <a16:creationId xmlns:a16="http://schemas.microsoft.com/office/drawing/2014/main" id="{1C9002DF-32FD-A1F7-98E1-0E3424846EC4}"/>
+              </a:ext>
+            </a:extLst>
+          </p:cNvPr>
+          <p:cNvPicPr>
+            <a:picLocks noChangeAspect="1"/>
+          </p:cNvPicPr>
+          <p:nvPr/>
+        </p:nvPicPr>
+        <p:blipFill>
+          <a:blip r:embed="rId13"/>
+          <a:srcRect l="4919" t="31707" r="6664" b="20579"/>
+          <a:stretch/>
+        </p:blipFill>
+        <p:spPr>
+          <a:xfrm>
+            <a:off x="3213478" y="3527438"/>
+            <a:ext cx="1070533" cy="911744"/>
+          </a:xfrm>
+          <a:prstGeom prst="rect">
+            <a:avLst/>
+          </a:prstGeom>
+        </p:spPr>
+      </p:pic>
+      <p:pic>
+        <p:nvPicPr>
+          <p:cNvPr id="16" name="Picture 15">
+            <a:extLst>
+              <a:ext uri="{FF2B5EF4-FFF2-40B4-BE49-F238E27FC236}">
+                <a16:creationId xmlns:a16="http://schemas.microsoft.com/office/drawing/2014/main" id="{6903485A-1B08-03BB-FD64-36C1A9C168FC}"/>
+              </a:ext>
+            </a:extLst>
+          </p:cNvPr>
+          <p:cNvPicPr>
+            <a:picLocks noChangeAspect="1"/>
+          </p:cNvPicPr>
+          <p:nvPr/>
+        </p:nvPicPr>
+        <p:blipFill>
+          <a:blip r:embed="rId13"/>
+          <a:srcRect l="4919" t="31707" r="6664" b="20579"/>
+          <a:stretch/>
+        </p:blipFill>
+        <p:spPr>
+          <a:xfrm>
+            <a:off x="4729545" y="1748884"/>
+            <a:ext cx="572353" cy="487458"/>
+          </a:xfrm>
+          <a:prstGeom prst="rect">
+            <a:avLst/>
+          </a:prstGeom>
+        </p:spPr>
+      </p:pic>
+      <p:pic>
+        <p:nvPicPr>
+          <p:cNvPr id="20" name="Picture 19">
+            <a:extLst>
+              <a:ext uri="{FF2B5EF4-FFF2-40B4-BE49-F238E27FC236}">
+                <a16:creationId xmlns:a16="http://schemas.microsoft.com/office/drawing/2014/main" id="{82D2F977-D0B5-1E6C-6549-015E638BECA7}"/>
+              </a:ext>
+            </a:extLst>
+          </p:cNvPr>
+          <p:cNvPicPr>
+            <a:picLocks noChangeAspect="1"/>
+          </p:cNvPicPr>
+          <p:nvPr/>
+        </p:nvPicPr>
+        <p:blipFill>
+          <a:blip r:embed="rId13"/>
+          <a:srcRect l="4919" t="31707" r="6664" b="20579"/>
+          <a:stretch/>
+        </p:blipFill>
+        <p:spPr>
+          <a:xfrm>
+            <a:off x="8789469" y="2211870"/>
+            <a:ext cx="572353" cy="487458"/>
+          </a:xfrm>
+          <a:prstGeom prst="rect">
+            <a:avLst/>
+          </a:prstGeom>
+        </p:spPr>
+      </p:pic>
+    </p:spTree>
+    <p:extLst>
+      <p:ext uri="{BB962C8B-B14F-4D97-AF65-F5344CB8AC3E}">
+        <p14:creationId xmlns:p14="http://schemas.microsoft.com/office/powerpoint/2010/main" val="3476764350"/>
+      </p:ext>
+    </p:extLst>
+  </p:cSld>
+  <p:clrMapOvr>
+    <a:masterClrMapping/>
+  </p:clrMapOvr>
+</p:sld>
+</file>
+
+<file path=ppt/slides/slide3.xml><?xml version="1.0" encoding="utf-8"?>
+<p:sld xmlns:a="http://schemas.openxmlformats.org/drawingml/2006/main" xmlns:r="http://schemas.openxmlformats.org/officeDocument/2006/relationships" xmlns:p="http://schemas.openxmlformats.org/presentationml/2006/main">
+  <p:cSld>
+    <p:spTree>
+      <p:nvGrpSpPr>
+        <p:cNvPr id="1" name=""/>
+        <p:cNvGrpSpPr/>
+        <p:nvPr/>
+      </p:nvGrpSpPr>
+      <p:grpSpPr>
+        <a:xfrm>
+          <a:off x="0" y="0"/>
+          <a:ext cx="0" cy="0"/>
+          <a:chOff x="0" y="0"/>
+          <a:chExt cx="0" cy="0"/>
+        </a:xfrm>
+      </p:grpSpPr>
+      <p:sp>
+        <p:nvSpPr>
+          <p:cNvPr id="2" name="Date Placeholder 1">
+            <a:extLst>
+              <a:ext uri="{FF2B5EF4-FFF2-40B4-BE49-F238E27FC236}">
+                <a16:creationId xmlns:a16="http://schemas.microsoft.com/office/drawing/2014/main" id="{1A9F4692-E48F-272C-645B-36D255BA5689}"/>
+              </a:ext>
+            </a:extLst>
+          </p:cNvPr>
+          <p:cNvSpPr>
+            <a:spLocks noGrp="1"/>
+          </p:cNvSpPr>
+          <p:nvPr>
+            <p:ph type="dt" sz="half" idx="10"/>
+          </p:nvPr>
+        </p:nvSpPr>
+        <p:spPr/>
+        <p:txBody>
+          <a:bodyPr/>
+          <a:lstStyle/>
+          <a:p>
+            <a:r>
+              <a:rPr lang="en-US"/>
+              <a:t>Vx.y Jan. 2023</a:t>
+            </a:r>
+            <a:endParaRPr lang="en-US" dirty="0"/>
+          </a:p>
+        </p:txBody>
+      </p:sp>
+      <p:sp>
+        <p:nvSpPr>
+          <p:cNvPr id="3" name="Footer Placeholder 2">
+            <a:extLst>
+              <a:ext uri="{FF2B5EF4-FFF2-40B4-BE49-F238E27FC236}">
+                <a16:creationId xmlns:a16="http://schemas.microsoft.com/office/drawing/2014/main" id="{CF90A7A0-54D3-79F0-B8F2-67DDC9318D03}"/>
+              </a:ext>
+            </a:extLst>
+          </p:cNvPr>
+          <p:cNvSpPr>
+            <a:spLocks noGrp="1"/>
+          </p:cNvSpPr>
+          <p:nvPr>
+            <p:ph type="ftr" sz="quarter" idx="11"/>
+          </p:nvPr>
+        </p:nvSpPr>
+        <p:spPr/>
+        <p:txBody>
+          <a:bodyPr/>
+          <a:lstStyle/>
+          <a:p>
+            <a:r>
+              <a:rPr lang="en-US"/>
+              <a:t>© MICROEJ 2023 - PUBLIC (leave blank) | INTERNAL USE | RESTRICTED &lt;COMPANY or Persons&gt;| CONFIDENTIAL | SECRET</a:t>
+            </a:r>
+            <a:endParaRPr lang="en-US" dirty="0"/>
+          </a:p>
+        </p:txBody>
+      </p:sp>
+      <p:pic>
+        <p:nvPicPr>
+          <p:cNvPr id="7" name="Picture 6">
+            <a:extLst>
+              <a:ext uri="{FF2B5EF4-FFF2-40B4-BE49-F238E27FC236}">
+                <a16:creationId xmlns:a16="http://schemas.microsoft.com/office/drawing/2014/main" id="{50155C7C-F49C-49E4-35F5-255FBBEDE5F3}"/>
+              </a:ext>
+            </a:extLst>
+          </p:cNvPr>
+          <p:cNvPicPr>
+            <a:picLocks noChangeAspect="1"/>
+          </p:cNvPicPr>
+          <p:nvPr/>
+        </p:nvPicPr>
+        <p:blipFill>
+          <a:blip r:embed="rId2" cstate="print">
+            <a:extLst>
+              <a:ext uri="{28A0092B-C50C-407E-A947-70E740481C1C}">
+                <a14:useLocalDpi xmlns:a14="http://schemas.microsoft.com/office/drawing/2010/main" val="0"/>
+              </a:ext>
+            </a:extLst>
+          </a:blip>
+          <a:srcRect l="19702" t="6038" r="22802"/>
+          <a:stretch/>
+        </p:blipFill>
+        <p:spPr>
+          <a:xfrm rot="5400000">
+            <a:off x="6895530" y="1848420"/>
+            <a:ext cx="2687190" cy="2470150"/>
+          </a:xfrm>
+          <a:prstGeom prst="rect">
+            <a:avLst/>
+          </a:prstGeom>
+        </p:spPr>
+      </p:pic>
+      <p:pic>
+        <p:nvPicPr>
+          <p:cNvPr id="5" name="Picture 4">
+            <a:extLst>
+              <a:ext uri="{FF2B5EF4-FFF2-40B4-BE49-F238E27FC236}">
+                <a16:creationId xmlns:a16="http://schemas.microsoft.com/office/drawing/2014/main" id="{33B904F9-03A1-1F56-9803-DBDC32FE2AAD}"/>
+              </a:ext>
+            </a:extLst>
+          </p:cNvPr>
+          <p:cNvPicPr>
+            <a:picLocks noChangeAspect="1"/>
+          </p:cNvPicPr>
+          <p:nvPr/>
+        </p:nvPicPr>
+        <p:blipFill>
+          <a:blip r:embed="rId3">
+            <a:extLst>
+              <a:ext uri="{28A0092B-C50C-407E-A947-70E740481C1C}">
+                <a14:useLocalDpi xmlns:a14="http://schemas.microsoft.com/office/drawing/2010/main" val="0"/>
+              </a:ext>
+            </a:extLst>
+          </a:blip>
+          <a:stretch>
+            <a:fillRect/>
+          </a:stretch>
+        </p:blipFill>
+        <p:spPr>
+          <a:xfrm rot="5400000">
+            <a:off x="5269361" y="2477506"/>
+            <a:ext cx="2542277" cy="1356890"/>
+          </a:xfrm>
+          <a:prstGeom prst="rect">
+            <a:avLst/>
+          </a:prstGeom>
+        </p:spPr>
+      </p:pic>
+    </p:spTree>
+    <p:extLst>
+      <p:ext uri="{BB962C8B-B14F-4D97-AF65-F5344CB8AC3E}">
+        <p14:creationId xmlns:p14="http://schemas.microsoft.com/office/powerpoint/2010/main" val="2175825159"/>
       </p:ext>
     </p:extLst>
   </p:cSld>

</xml_diff>